<commit_message>
Se actualizó la historia principal del juego. Ahora sólo consiste en una misión.
</commit_message>
<xml_diff>
--- a/doc/app/Historia/Historia y Misiones - 1982.pptx
+++ b/doc/app/Historia/Historia y Misiones - 1982.pptx
@@ -2,13 +2,11 @@
 <file path=ppt/presentation.xml><?xml version="1.0" encoding="utf-8"?>
 <p:presentation xmlns:a="http://schemas.openxmlformats.org/drawingml/2006/main" xmlns:r="http://schemas.openxmlformats.org/officeDocument/2006/relationships" xmlns:p="http://schemas.openxmlformats.org/presentationml/2006/main" saveSubsetFonts="1">
   <p:sldMasterIdLst>
-    <p:sldMasterId id="2147483672" r:id="rId1"/>
+    <p:sldMasterId id="2147483660" r:id="rId1"/>
   </p:sldMasterIdLst>
   <p:sldIdLst>
-    <p:sldId id="260" r:id="rId2"/>
-    <p:sldId id="256" r:id="rId3"/>
-    <p:sldId id="257" r:id="rId4"/>
-    <p:sldId id="259" r:id="rId5"/>
+    <p:sldId id="262" r:id="rId2"/>
+    <p:sldId id="261" r:id="rId3"/>
   </p:sldIdLst>
   <p:sldSz cx="12192000" cy="6858000"/>
   <p:notesSz cx="6858000" cy="9144000"/>
@@ -518,7 +516,7 @@
           <a:p>
             <a:fld id="{CE4B764F-D038-44F8-9D1C-14BF7D206702}" type="datetimeFigureOut">
               <a:rPr lang="es-AR" smtClean="0"/>
-              <a:t>25/08/2016</a:t>
+              <a:t>27/08/2016</a:t>
             </a:fld>
             <a:endParaRPr lang="es-AR"/>
           </a:p>
@@ -578,7 +576,7 @@
     </p:spTree>
     <p:extLst>
       <p:ext uri="{BB962C8B-B14F-4D97-AF65-F5344CB8AC3E}">
-        <p14:creationId xmlns:p14="http://schemas.microsoft.com/office/powerpoint/2010/main" val="1158736874"/>
+        <p14:creationId xmlns:p14="http://schemas.microsoft.com/office/powerpoint/2010/main" val="3671653168"/>
       </p:ext>
     </p:extLst>
   </p:cSld>
@@ -697,7 +695,7 @@
           <a:p>
             <a:fld id="{CE4B764F-D038-44F8-9D1C-14BF7D206702}" type="datetimeFigureOut">
               <a:rPr lang="es-AR" smtClean="0"/>
-              <a:t>25/08/2016</a:t>
+              <a:t>27/08/2016</a:t>
             </a:fld>
             <a:endParaRPr lang="es-AR"/>
           </a:p>
@@ -748,7 +746,7 @@
     </p:spTree>
     <p:extLst>
       <p:ext uri="{BB962C8B-B14F-4D97-AF65-F5344CB8AC3E}">
-        <p14:creationId xmlns:p14="http://schemas.microsoft.com/office/powerpoint/2010/main" val="3338391157"/>
+        <p14:creationId xmlns:p14="http://schemas.microsoft.com/office/powerpoint/2010/main" val="3028498731"/>
       </p:ext>
     </p:extLst>
   </p:cSld>
@@ -877,7 +875,7 @@
           <a:p>
             <a:fld id="{CE4B764F-D038-44F8-9D1C-14BF7D206702}" type="datetimeFigureOut">
               <a:rPr lang="es-AR" smtClean="0"/>
-              <a:t>25/08/2016</a:t>
+              <a:t>27/08/2016</a:t>
             </a:fld>
             <a:endParaRPr lang="es-AR"/>
           </a:p>
@@ -928,7 +926,7 @@
     </p:spTree>
     <p:extLst>
       <p:ext uri="{BB962C8B-B14F-4D97-AF65-F5344CB8AC3E}">
-        <p14:creationId xmlns:p14="http://schemas.microsoft.com/office/powerpoint/2010/main" val="4067997350"/>
+        <p14:creationId xmlns:p14="http://schemas.microsoft.com/office/powerpoint/2010/main" val="3623233455"/>
       </p:ext>
     </p:extLst>
   </p:cSld>
@@ -1047,7 +1045,7 @@
           <a:p>
             <a:fld id="{CE4B764F-D038-44F8-9D1C-14BF7D206702}" type="datetimeFigureOut">
               <a:rPr lang="es-AR" smtClean="0"/>
-              <a:t>25/08/2016</a:t>
+              <a:t>27/08/2016</a:t>
             </a:fld>
             <a:endParaRPr lang="es-AR"/>
           </a:p>
@@ -1098,7 +1096,7 @@
     </p:spTree>
     <p:extLst>
       <p:ext uri="{BB962C8B-B14F-4D97-AF65-F5344CB8AC3E}">
-        <p14:creationId xmlns:p14="http://schemas.microsoft.com/office/powerpoint/2010/main" val="3370377108"/>
+        <p14:creationId xmlns:p14="http://schemas.microsoft.com/office/powerpoint/2010/main" val="3597357909"/>
       </p:ext>
     </p:extLst>
   </p:cSld>
@@ -1360,7 +1358,7 @@
           <a:p>
             <a:fld id="{CE4B764F-D038-44F8-9D1C-14BF7D206702}" type="datetimeFigureOut">
               <a:rPr lang="es-AR" smtClean="0"/>
-              <a:t>25/08/2016</a:t>
+              <a:t>27/08/2016</a:t>
             </a:fld>
             <a:endParaRPr lang="es-AR"/>
           </a:p>
@@ -1509,7 +1507,7 @@
     </p:spTree>
     <p:extLst>
       <p:ext uri="{BB962C8B-B14F-4D97-AF65-F5344CB8AC3E}">
-        <p14:creationId xmlns:p14="http://schemas.microsoft.com/office/powerpoint/2010/main" val="2147123762"/>
+        <p14:creationId xmlns:p14="http://schemas.microsoft.com/office/powerpoint/2010/main" val="395822512"/>
       </p:ext>
     </p:extLst>
   </p:cSld>
@@ -1746,7 +1744,7 @@
           <a:p>
             <a:fld id="{CE4B764F-D038-44F8-9D1C-14BF7D206702}" type="datetimeFigureOut">
               <a:rPr lang="es-AR" smtClean="0"/>
-              <a:t>25/08/2016</a:t>
+              <a:t>27/08/2016</a:t>
             </a:fld>
             <a:endParaRPr lang="es-AR"/>
           </a:p>
@@ -1797,7 +1795,7 @@
     </p:spTree>
     <p:extLst>
       <p:ext uri="{BB962C8B-B14F-4D97-AF65-F5344CB8AC3E}">
-        <p14:creationId xmlns:p14="http://schemas.microsoft.com/office/powerpoint/2010/main" val="1647848815"/>
+        <p14:creationId xmlns:p14="http://schemas.microsoft.com/office/powerpoint/2010/main" val="3642624042"/>
       </p:ext>
     </p:extLst>
   </p:cSld>
@@ -2180,7 +2178,7 @@
           <a:p>
             <a:fld id="{CE4B764F-D038-44F8-9D1C-14BF7D206702}" type="datetimeFigureOut">
               <a:rPr lang="es-AR" smtClean="0"/>
-              <a:t>25/08/2016</a:t>
+              <a:t>27/08/2016</a:t>
             </a:fld>
             <a:endParaRPr lang="es-AR"/>
           </a:p>
@@ -2231,7 +2229,7 @@
     </p:spTree>
     <p:extLst>
       <p:ext uri="{BB962C8B-B14F-4D97-AF65-F5344CB8AC3E}">
-        <p14:creationId xmlns:p14="http://schemas.microsoft.com/office/powerpoint/2010/main" val="514809345"/>
+        <p14:creationId xmlns:p14="http://schemas.microsoft.com/office/powerpoint/2010/main" val="242254210"/>
       </p:ext>
     </p:extLst>
   </p:cSld>
@@ -2298,7 +2296,7 @@
           <a:p>
             <a:fld id="{CE4B764F-D038-44F8-9D1C-14BF7D206702}" type="datetimeFigureOut">
               <a:rPr lang="es-AR" smtClean="0"/>
-              <a:t>25/08/2016</a:t>
+              <a:t>27/08/2016</a:t>
             </a:fld>
             <a:endParaRPr lang="es-AR"/>
           </a:p>
@@ -2349,7 +2347,7 @@
     </p:spTree>
     <p:extLst>
       <p:ext uri="{BB962C8B-B14F-4D97-AF65-F5344CB8AC3E}">
-        <p14:creationId xmlns:p14="http://schemas.microsoft.com/office/powerpoint/2010/main" val="1604863648"/>
+        <p14:creationId xmlns:p14="http://schemas.microsoft.com/office/powerpoint/2010/main" val="429801055"/>
       </p:ext>
     </p:extLst>
   </p:cSld>
@@ -2393,7 +2391,7 @@
           <a:p>
             <a:fld id="{CE4B764F-D038-44F8-9D1C-14BF7D206702}" type="datetimeFigureOut">
               <a:rPr lang="es-AR" smtClean="0"/>
-              <a:t>25/08/2016</a:t>
+              <a:t>27/08/2016</a:t>
             </a:fld>
             <a:endParaRPr lang="es-AR"/>
           </a:p>
@@ -2444,7 +2442,7 @@
     </p:spTree>
     <p:extLst>
       <p:ext uri="{BB962C8B-B14F-4D97-AF65-F5344CB8AC3E}">
-        <p14:creationId xmlns:p14="http://schemas.microsoft.com/office/powerpoint/2010/main" val="1038135497"/>
+        <p14:creationId xmlns:p14="http://schemas.microsoft.com/office/powerpoint/2010/main" val="237618140"/>
       </p:ext>
     </p:extLst>
   </p:cSld>
@@ -2743,7 +2741,7 @@
           <a:p>
             <a:fld id="{CE4B764F-D038-44F8-9D1C-14BF7D206702}" type="datetimeFigureOut">
               <a:rPr lang="es-AR" smtClean="0"/>
-              <a:t>25/08/2016</a:t>
+              <a:t>27/08/2016</a:t>
             </a:fld>
             <a:endParaRPr lang="es-AR"/>
           </a:p>
@@ -2883,7 +2881,7 @@
     </p:spTree>
     <p:extLst>
       <p:ext uri="{BB962C8B-B14F-4D97-AF65-F5344CB8AC3E}">
-        <p14:creationId xmlns:p14="http://schemas.microsoft.com/office/powerpoint/2010/main" val="2771681725"/>
+        <p14:creationId xmlns:p14="http://schemas.microsoft.com/office/powerpoint/2010/main" val="3633128735"/>
       </p:ext>
     </p:extLst>
   </p:cSld>
@@ -3168,7 +3166,7 @@
           <a:p>
             <a:fld id="{CE4B764F-D038-44F8-9D1C-14BF7D206702}" type="datetimeFigureOut">
               <a:rPr lang="es-AR" smtClean="0"/>
-              <a:t>25/08/2016</a:t>
+              <a:t>27/08/2016</a:t>
             </a:fld>
             <a:endParaRPr lang="es-AR"/>
           </a:p>
@@ -3289,7 +3287,7 @@
     </p:spTree>
     <p:extLst>
       <p:ext uri="{BB962C8B-B14F-4D97-AF65-F5344CB8AC3E}">
-        <p14:creationId xmlns:p14="http://schemas.microsoft.com/office/powerpoint/2010/main" val="3396438064"/>
+        <p14:creationId xmlns:p14="http://schemas.microsoft.com/office/powerpoint/2010/main" val="3130313636"/>
       </p:ext>
     </p:extLst>
   </p:cSld>
@@ -3449,7 +3447,7 @@
           <a:p>
             <a:fld id="{CE4B764F-D038-44F8-9D1C-14BF7D206702}" type="datetimeFigureOut">
               <a:rPr lang="es-AR" smtClean="0"/>
-              <a:t>25/08/2016</a:t>
+              <a:t>27/08/2016</a:t>
             </a:fld>
             <a:endParaRPr lang="es-AR"/>
           </a:p>
@@ -3622,23 +3620,23 @@
     </p:spTree>
     <p:extLst>
       <p:ext uri="{BB962C8B-B14F-4D97-AF65-F5344CB8AC3E}">
-        <p14:creationId xmlns:p14="http://schemas.microsoft.com/office/powerpoint/2010/main" val="2635008372"/>
+        <p14:creationId xmlns:p14="http://schemas.microsoft.com/office/powerpoint/2010/main" val="2078312486"/>
       </p:ext>
     </p:extLst>
   </p:cSld>
   <p:clrMap bg1="lt1" tx1="dk1" bg2="lt2" tx2="dk2" accent1="accent1" accent2="accent2" accent3="accent3" accent4="accent4" accent5="accent5" accent6="accent6" hlink="hlink" folHlink="folHlink"/>
   <p:sldLayoutIdLst>
-    <p:sldLayoutId id="2147483673" r:id="rId1"/>
-    <p:sldLayoutId id="2147483674" r:id="rId2"/>
-    <p:sldLayoutId id="2147483675" r:id="rId3"/>
-    <p:sldLayoutId id="2147483676" r:id="rId4"/>
-    <p:sldLayoutId id="2147483677" r:id="rId5"/>
-    <p:sldLayoutId id="2147483678" r:id="rId6"/>
-    <p:sldLayoutId id="2147483679" r:id="rId7"/>
-    <p:sldLayoutId id="2147483680" r:id="rId8"/>
-    <p:sldLayoutId id="2147483681" r:id="rId9"/>
-    <p:sldLayoutId id="2147483682" r:id="rId10"/>
-    <p:sldLayoutId id="2147483683" r:id="rId11"/>
+    <p:sldLayoutId id="2147483661" r:id="rId1"/>
+    <p:sldLayoutId id="2147483662" r:id="rId2"/>
+    <p:sldLayoutId id="2147483663" r:id="rId3"/>
+    <p:sldLayoutId id="2147483664" r:id="rId4"/>
+    <p:sldLayoutId id="2147483665" r:id="rId5"/>
+    <p:sldLayoutId id="2147483666" r:id="rId6"/>
+    <p:sldLayoutId id="2147483667" r:id="rId7"/>
+    <p:sldLayoutId id="2147483668" r:id="rId8"/>
+    <p:sldLayoutId id="2147483669" r:id="rId9"/>
+    <p:sldLayoutId id="2147483670" r:id="rId10"/>
+    <p:sldLayoutId id="2147483671" r:id="rId11"/>
   </p:sldLayoutIdLst>
   <p:txStyles>
     <p:titleStyle>
@@ -4161,7 +4159,7 @@
     </p:spTree>
     <p:extLst>
       <p:ext uri="{BB962C8B-B14F-4D97-AF65-F5344CB8AC3E}">
-        <p14:creationId xmlns:p14="http://schemas.microsoft.com/office/powerpoint/2010/main" val="3057166595"/>
+        <p14:creationId xmlns:p14="http://schemas.microsoft.com/office/powerpoint/2010/main" val="1097266872"/>
       </p:ext>
     </p:extLst>
   </p:cSld>
@@ -4179,720 +4177,6 @@
 </file>
 
 <file path=ppt/slides/slide2.xml><?xml version="1.0" encoding="utf-8"?>
-<p:sld xmlns:a="http://schemas.openxmlformats.org/drawingml/2006/main" xmlns:r="http://schemas.openxmlformats.org/officeDocument/2006/relationships" xmlns:p="http://schemas.openxmlformats.org/presentationml/2006/main">
-  <p:cSld>
-    <p:spTree>
-      <p:nvGrpSpPr>
-        <p:cNvPr id="1" name=""/>
-        <p:cNvGrpSpPr/>
-        <p:nvPr/>
-      </p:nvGrpSpPr>
-      <p:grpSpPr>
-        <a:xfrm>
-          <a:off x="0" y="0"/>
-          <a:ext cx="0" cy="0"/>
-          <a:chOff x="0" y="0"/>
-          <a:chExt cx="0" cy="0"/>
-        </a:xfrm>
-      </p:grpSpPr>
-      <p:sp>
-        <p:nvSpPr>
-          <p:cNvPr id="2" name="Título 1"/>
-          <p:cNvSpPr>
-            <a:spLocks noGrp="1"/>
-          </p:cNvSpPr>
-          <p:nvPr>
-            <p:ph type="ctrTitle"/>
-          </p:nvPr>
-        </p:nvSpPr>
-        <p:spPr/>
-        <p:txBody>
-          <a:bodyPr>
-            <a:normAutofit/>
-          </a:bodyPr>
-          <a:lstStyle/>
-          <a:p>
-            <a:r>
-              <a:rPr lang="en-US" sz="2700" dirty="0" smtClean="0">
-                <a:latin typeface="OCR A Extended" panose="02010509020102010303" pitchFamily="50" charset="0"/>
-              </a:rPr>
-              <a:t>1982</a:t>
-            </a:r>
-            <a:r>
-              <a:rPr lang="en-US" dirty="0" smtClean="0">
-                <a:latin typeface="OCR A Extended" panose="02010509020102010303" pitchFamily="50" charset="0"/>
-              </a:rPr>
-              <a:t/>
-            </a:r>
-            <a:br>
-              <a:rPr lang="en-US" dirty="0" smtClean="0">
-                <a:latin typeface="OCR A Extended" panose="02010509020102010303" pitchFamily="50" charset="0"/>
-              </a:rPr>
-            </a:br>
-            <a:r>
-              <a:rPr lang="en-US" sz="3100" dirty="0" smtClean="0">
-                <a:latin typeface="OCR A Extended" panose="02010509020102010303" pitchFamily="50" charset="0"/>
-              </a:rPr>
-              <a:t>4 de mayo</a:t>
-            </a:r>
-            <a:r>
-              <a:rPr lang="en-US" sz="3100" dirty="0">
-                <a:latin typeface="OCR A Extended" panose="02010509020102010303" pitchFamily="50" charset="0"/>
-              </a:rPr>
-              <a:t> </a:t>
-            </a:r>
-            <a:r>
-              <a:rPr lang="en-US" sz="3100" dirty="0" smtClean="0">
-                <a:latin typeface="OCR A Extended" panose="02010509020102010303" pitchFamily="50" charset="0"/>
-              </a:rPr>
-              <a:t>- 11:00hs</a:t>
-            </a:r>
-            <a:r>
-              <a:rPr lang="en-US" dirty="0" smtClean="0">
-                <a:latin typeface="OCR A Extended" panose="02010509020102010303" pitchFamily="50" charset="0"/>
-              </a:rPr>
-              <a:t/>
-            </a:r>
-            <a:br>
-              <a:rPr lang="en-US" dirty="0" smtClean="0">
-                <a:latin typeface="OCR A Extended" panose="02010509020102010303" pitchFamily="50" charset="0"/>
-              </a:rPr>
-            </a:br>
-            <a:r>
-              <a:rPr lang="en-US" dirty="0" smtClean="0">
-                <a:latin typeface="OCR A Extended" panose="02010509020102010303" pitchFamily="50" charset="0"/>
-              </a:rPr>
-              <a:t>“La </a:t>
-            </a:r>
-            <a:r>
-              <a:rPr lang="en-US" dirty="0" err="1" smtClean="0">
-                <a:latin typeface="OCR A Extended" panose="02010509020102010303" pitchFamily="50" charset="0"/>
-              </a:rPr>
-              <a:t>venganza</a:t>
-            </a:r>
-            <a:r>
-              <a:rPr lang="en-US" dirty="0" smtClean="0">
-                <a:latin typeface="OCR A Extended" panose="02010509020102010303" pitchFamily="50" charset="0"/>
-              </a:rPr>
-              <a:t>”</a:t>
-            </a:r>
-            <a:endParaRPr lang="es-AR" dirty="0">
-              <a:latin typeface="OCR A Extended" panose="02010509020102010303" pitchFamily="50" charset="0"/>
-            </a:endParaRPr>
-          </a:p>
-        </p:txBody>
-      </p:sp>
-      <p:sp>
-        <p:nvSpPr>
-          <p:cNvPr id="3" name="Subtítulo 2"/>
-          <p:cNvSpPr>
-            <a:spLocks noGrp="1"/>
-          </p:cNvSpPr>
-          <p:nvPr>
-            <p:ph type="subTitle" idx="1"/>
-          </p:nvPr>
-        </p:nvSpPr>
-        <p:spPr>
-          <a:xfrm>
-            <a:off x="4667086" y="4360452"/>
-            <a:ext cx="6800566" cy="2352320"/>
-          </a:xfrm>
-        </p:spPr>
-        <p:txBody>
-          <a:bodyPr>
-            <a:normAutofit fontScale="92500" lnSpcReduction="10000"/>
-          </a:bodyPr>
-          <a:lstStyle/>
-          <a:p>
-            <a:r>
-              <a:rPr lang="en-US" sz="1600" b="1" dirty="0" err="1" smtClean="0"/>
-              <a:t>Avión</a:t>
-            </a:r>
-            <a:r>
-              <a:rPr lang="en-US" sz="1600" b="1" dirty="0" smtClean="0"/>
-              <a:t> de la </a:t>
-            </a:r>
-            <a:r>
-              <a:rPr lang="en-US" sz="1600" b="1" dirty="0" err="1" smtClean="0"/>
-              <a:t>misión</a:t>
-            </a:r>
-            <a:r>
-              <a:rPr lang="en-US" sz="1600" b="1" dirty="0" smtClean="0"/>
-              <a:t>:</a:t>
-            </a:r>
-            <a:r>
-              <a:rPr lang="en-US" sz="1600" dirty="0" smtClean="0"/>
-              <a:t> (Marcel </a:t>
-            </a:r>
-            <a:r>
-              <a:rPr lang="en-US" sz="1600" dirty="0" err="1" smtClean="0"/>
-              <a:t>Dassault</a:t>
-            </a:r>
-            <a:r>
-              <a:rPr lang="en-US" sz="1600" dirty="0" smtClean="0"/>
-              <a:t>) </a:t>
-            </a:r>
-            <a:r>
-              <a:rPr lang="en-US" sz="1600" dirty="0"/>
-              <a:t>Super </a:t>
-            </a:r>
-            <a:r>
-              <a:rPr lang="en-US" sz="1600" dirty="0" err="1" smtClean="0"/>
-              <a:t>Étendard</a:t>
-            </a:r>
-            <a:r>
-              <a:rPr lang="en-US" sz="1600" dirty="0"/>
-              <a:t>, </a:t>
-            </a:r>
-            <a:r>
-              <a:rPr lang="en-US" sz="1600" dirty="0" err="1" smtClean="0"/>
-              <a:t>perteneciente</a:t>
-            </a:r>
-            <a:r>
-              <a:rPr lang="en-US" sz="1600" dirty="0" smtClean="0"/>
-              <a:t> al </a:t>
-            </a:r>
-            <a:r>
-              <a:rPr lang="es-AR" sz="1600" dirty="0"/>
-              <a:t>2do Esc. Aeronaval Caza y Ataque</a:t>
-            </a:r>
-            <a:r>
-              <a:rPr lang="en-US" sz="1600" dirty="0" smtClean="0"/>
-              <a:t> de la Armada Argentina (ARA).</a:t>
-            </a:r>
-          </a:p>
-          <a:p>
-            <a:r>
-              <a:rPr lang="en-US" sz="1600" b="1" dirty="0" err="1" smtClean="0"/>
-              <a:t>Contexto</a:t>
-            </a:r>
-            <a:r>
-              <a:rPr lang="en-US" sz="1600" b="1" dirty="0" smtClean="0"/>
-              <a:t> / </a:t>
-            </a:r>
-            <a:r>
-              <a:rPr lang="en-US" sz="1600" b="1" dirty="0" err="1" smtClean="0"/>
-              <a:t>Situación</a:t>
-            </a:r>
-            <a:r>
-              <a:rPr lang="en-US" sz="1600" b="1" dirty="0" smtClean="0"/>
-              <a:t> </a:t>
-            </a:r>
-            <a:r>
-              <a:rPr lang="en-US" sz="1600" b="1" dirty="0" err="1" smtClean="0"/>
-              <a:t>táctica</a:t>
-            </a:r>
-            <a:r>
-              <a:rPr lang="en-US" sz="1600" b="1" dirty="0" smtClean="0"/>
-              <a:t>: </a:t>
-            </a:r>
-            <a:r>
-              <a:rPr lang="en-US" sz="1600" dirty="0" smtClean="0"/>
-              <a:t>Los </a:t>
-            </a:r>
-            <a:r>
-              <a:rPr lang="en-US" sz="1600" dirty="0" err="1" smtClean="0"/>
-              <a:t>incansables</a:t>
-            </a:r>
-            <a:r>
-              <a:rPr lang="en-US" sz="1600" dirty="0" smtClean="0"/>
-              <a:t> </a:t>
-            </a:r>
-            <a:r>
-              <a:rPr lang="en-US" sz="1600" dirty="0" err="1" smtClean="0"/>
-              <a:t>esfuerzos</a:t>
-            </a:r>
-            <a:r>
-              <a:rPr lang="en-US" sz="1600" dirty="0" smtClean="0"/>
-              <a:t> </a:t>
-            </a:r>
-            <a:r>
-              <a:rPr lang="en-US" sz="1600" dirty="0" err="1" smtClean="0"/>
-              <a:t>diplomáticos</a:t>
-            </a:r>
-            <a:r>
-              <a:rPr lang="en-US" sz="1600" dirty="0" smtClean="0"/>
-              <a:t> </a:t>
-            </a:r>
-            <a:r>
-              <a:rPr lang="en-US" sz="1600" dirty="0" err="1" smtClean="0"/>
-              <a:t>por</a:t>
-            </a:r>
-            <a:r>
-              <a:rPr lang="en-US" sz="1600" dirty="0" smtClean="0"/>
-              <a:t> </a:t>
-            </a:r>
-            <a:r>
-              <a:rPr lang="en-US" sz="1600" dirty="0" err="1" smtClean="0"/>
-              <a:t>llegar</a:t>
-            </a:r>
-            <a:r>
-              <a:rPr lang="en-US" sz="1600" dirty="0" smtClean="0"/>
-              <a:t> a </a:t>
-            </a:r>
-            <a:r>
-              <a:rPr lang="en-US" sz="1600" dirty="0" err="1" smtClean="0"/>
-              <a:t>una</a:t>
-            </a:r>
-            <a:r>
-              <a:rPr lang="en-US" sz="1600" dirty="0" smtClean="0"/>
-              <a:t> </a:t>
-            </a:r>
-            <a:r>
-              <a:rPr lang="en-US" sz="1600" dirty="0" err="1" smtClean="0"/>
-              <a:t>tregua</a:t>
-            </a:r>
-            <a:r>
-              <a:rPr lang="en-US" sz="1600" dirty="0" smtClean="0"/>
-              <a:t> </a:t>
-            </a:r>
-            <a:r>
-              <a:rPr lang="en-US" sz="1600" dirty="0" err="1" smtClean="0"/>
-              <a:t>finalmente</a:t>
-            </a:r>
-            <a:r>
-              <a:rPr lang="en-US" sz="1600" dirty="0" smtClean="0"/>
-              <a:t> </a:t>
-            </a:r>
-            <a:r>
-              <a:rPr lang="en-US" sz="1600" dirty="0" err="1" smtClean="0"/>
-              <a:t>fracasaron</a:t>
-            </a:r>
-            <a:r>
-              <a:rPr lang="en-US" sz="1600" dirty="0" smtClean="0"/>
-              <a:t> </a:t>
-            </a:r>
-            <a:r>
-              <a:rPr lang="en-US" sz="1600" dirty="0" err="1" smtClean="0"/>
-              <a:t>anteayer</a:t>
-            </a:r>
-            <a:r>
-              <a:rPr lang="en-US" sz="1600" dirty="0" smtClean="0"/>
-              <a:t>, con el </a:t>
-            </a:r>
-            <a:r>
-              <a:rPr lang="en-US" sz="1600" dirty="0" err="1" smtClean="0"/>
-              <a:t>hundimiento</a:t>
-            </a:r>
-            <a:r>
-              <a:rPr lang="en-US" sz="1600" dirty="0" smtClean="0"/>
-              <a:t> del </a:t>
-            </a:r>
-            <a:r>
-              <a:rPr lang="en-US" sz="1600" dirty="0" err="1" smtClean="0"/>
-              <a:t>Crucero</a:t>
-            </a:r>
-            <a:r>
-              <a:rPr lang="en-US" sz="1600" dirty="0" smtClean="0"/>
-              <a:t> General </a:t>
-            </a:r>
-            <a:r>
-              <a:rPr lang="en-US" sz="1600" dirty="0" err="1" smtClean="0"/>
-              <a:t>Belgrano</a:t>
-            </a:r>
-            <a:r>
-              <a:rPr lang="en-US" sz="1600" dirty="0" smtClean="0"/>
-              <a:t> a </a:t>
-            </a:r>
-            <a:r>
-              <a:rPr lang="en-US" sz="1600" dirty="0" err="1" smtClean="0"/>
-              <a:t>manos</a:t>
-            </a:r>
-            <a:r>
-              <a:rPr lang="en-US" sz="1600" dirty="0" smtClean="0"/>
-              <a:t> de la Royal Navy. </a:t>
-            </a:r>
-            <a:r>
-              <a:rPr lang="en-US" sz="1600" dirty="0" err="1" smtClean="0"/>
-              <a:t>Ahora</a:t>
-            </a:r>
-            <a:r>
-              <a:rPr lang="en-US" sz="1600" dirty="0" smtClean="0"/>
-              <a:t> la ARA </a:t>
-            </a:r>
-            <a:r>
-              <a:rPr lang="en-US" sz="1600" dirty="0" err="1" smtClean="0"/>
-              <a:t>tendrá</a:t>
-            </a:r>
-            <a:r>
-              <a:rPr lang="en-US" sz="1600" dirty="0" smtClean="0"/>
-              <a:t> la </a:t>
-            </a:r>
-            <a:r>
-              <a:rPr lang="en-US" sz="1600" dirty="0" err="1" smtClean="0"/>
-              <a:t>oportunidad</a:t>
-            </a:r>
-            <a:r>
-              <a:rPr lang="en-US" sz="1600" dirty="0" smtClean="0"/>
-              <a:t> de </a:t>
-            </a:r>
-            <a:r>
-              <a:rPr lang="en-US" sz="1600" dirty="0" err="1" smtClean="0"/>
-              <a:t>devolverles</a:t>
-            </a:r>
-            <a:r>
-              <a:rPr lang="en-US" sz="1600" dirty="0" smtClean="0"/>
-              <a:t> el </a:t>
-            </a:r>
-            <a:r>
-              <a:rPr lang="en-US" sz="1600" dirty="0" err="1" smtClean="0"/>
-              <a:t>golpe</a:t>
-            </a:r>
-            <a:r>
-              <a:rPr lang="en-US" sz="1600" dirty="0" smtClean="0"/>
-              <a:t>... </a:t>
-            </a:r>
-            <a:r>
-              <a:rPr lang="en-US" sz="1600" dirty="0" err="1" smtClean="0"/>
-              <a:t>Ojo</a:t>
-            </a:r>
-            <a:r>
-              <a:rPr lang="en-US" sz="1600" dirty="0" smtClean="0"/>
-              <a:t> </a:t>
-            </a:r>
-            <a:r>
-              <a:rPr lang="en-US" sz="1600" dirty="0" err="1" smtClean="0"/>
-              <a:t>por</a:t>
-            </a:r>
-            <a:r>
-              <a:rPr lang="en-US" sz="1600" dirty="0" smtClean="0"/>
-              <a:t> </a:t>
-            </a:r>
-            <a:r>
-              <a:rPr lang="en-US" sz="1600" dirty="0" err="1" smtClean="0"/>
-              <a:t>ojo</a:t>
-            </a:r>
-            <a:r>
-              <a:rPr lang="en-US" sz="1600" dirty="0" smtClean="0"/>
-              <a:t>…</a:t>
-            </a:r>
-          </a:p>
-          <a:p>
-            <a:r>
-              <a:rPr lang="en-US" sz="1600" b="1" dirty="0" err="1" smtClean="0"/>
-              <a:t>Objetivo</a:t>
-            </a:r>
-            <a:r>
-              <a:rPr lang="en-US" sz="1600" b="1" dirty="0" smtClean="0"/>
-              <a:t>: </a:t>
-            </a:r>
-            <a:r>
-              <a:rPr lang="en-US" sz="1600" dirty="0" err="1" smtClean="0"/>
-              <a:t>Enganchar</a:t>
-            </a:r>
-            <a:r>
-              <a:rPr lang="en-US" sz="1600" dirty="0" smtClean="0"/>
-              <a:t> </a:t>
-            </a:r>
-            <a:r>
-              <a:rPr lang="en-US" sz="1600" dirty="0" err="1" smtClean="0"/>
-              <a:t>blanco</a:t>
-            </a:r>
-            <a:r>
-              <a:rPr lang="en-US" sz="1600" dirty="0" smtClean="0"/>
-              <a:t> naval </a:t>
-            </a:r>
-            <a:r>
-              <a:rPr lang="en-US" sz="1600" dirty="0" err="1" smtClean="0"/>
-              <a:t>enemigo</a:t>
-            </a:r>
-            <a:r>
-              <a:rPr lang="en-US" sz="1600" dirty="0" smtClean="0"/>
-              <a:t> y </a:t>
-            </a:r>
-            <a:r>
-              <a:rPr lang="en-US" sz="1600" dirty="0" err="1" smtClean="0"/>
-              <a:t>dispararle</a:t>
-            </a:r>
-            <a:r>
-              <a:rPr lang="en-US" sz="1600" dirty="0" smtClean="0"/>
-              <a:t> </a:t>
-            </a:r>
-            <a:r>
-              <a:rPr lang="en-US" sz="1600" dirty="0" err="1" smtClean="0"/>
-              <a:t>misil</a:t>
-            </a:r>
-            <a:r>
-              <a:rPr lang="en-US" sz="1600" dirty="0" smtClean="0"/>
-              <a:t> </a:t>
-            </a:r>
-            <a:r>
-              <a:rPr lang="en-US" sz="1600" dirty="0" err="1" smtClean="0"/>
-              <a:t>Exocet</a:t>
-            </a:r>
-            <a:r>
-              <a:rPr lang="en-US" sz="1600" dirty="0" smtClean="0"/>
-              <a:t>.</a:t>
-            </a:r>
-          </a:p>
-          <a:p>
-            <a:r>
-              <a:rPr lang="en-US" sz="1600" b="1" dirty="0" smtClean="0"/>
-              <a:t>Se </a:t>
-            </a:r>
-            <a:r>
-              <a:rPr lang="en-US" sz="1600" b="1" dirty="0" err="1" smtClean="0"/>
-              <a:t>pierde</a:t>
-            </a:r>
-            <a:r>
-              <a:rPr lang="en-US" sz="1600" b="1" dirty="0" smtClean="0"/>
-              <a:t> </a:t>
-            </a:r>
-            <a:r>
-              <a:rPr lang="en-US" sz="1600" b="1" dirty="0" err="1" smtClean="0"/>
-              <a:t>si</a:t>
-            </a:r>
-            <a:r>
-              <a:rPr lang="en-US" sz="1600" b="1" dirty="0" smtClean="0"/>
-              <a:t> la </a:t>
-            </a:r>
-            <a:r>
-              <a:rPr lang="en-US" sz="1600" b="1" dirty="0" err="1" smtClean="0"/>
-              <a:t>aeronave</a:t>
-            </a:r>
-            <a:r>
-              <a:rPr lang="en-US" sz="1600" b="1" dirty="0" smtClean="0"/>
-              <a:t>:</a:t>
-            </a:r>
-            <a:r>
-              <a:rPr lang="en-US" sz="1600" dirty="0"/>
-              <a:t>	</a:t>
-            </a:r>
-            <a:r>
-              <a:rPr lang="en-US" sz="1600" dirty="0" smtClean="0"/>
-              <a:t>- </a:t>
-            </a:r>
-            <a:r>
-              <a:rPr lang="en-US" sz="1600" dirty="0" err="1" smtClean="0"/>
-              <a:t>Es</a:t>
-            </a:r>
-            <a:r>
-              <a:rPr lang="en-US" sz="1600" dirty="0" smtClean="0"/>
-              <a:t> </a:t>
-            </a:r>
-            <a:r>
-              <a:rPr lang="en-US" sz="1600" dirty="0" err="1" smtClean="0"/>
-              <a:t>iluminada</a:t>
-            </a:r>
-            <a:r>
-              <a:rPr lang="en-US" sz="1600" dirty="0" smtClean="0"/>
-              <a:t> </a:t>
-            </a:r>
-            <a:r>
-              <a:rPr lang="en-US" sz="1600" dirty="0" err="1" smtClean="0"/>
-              <a:t>por</a:t>
-            </a:r>
-            <a:r>
-              <a:rPr lang="en-US" sz="1600" dirty="0" smtClean="0"/>
-              <a:t> el radar </a:t>
-            </a:r>
-            <a:r>
-              <a:rPr lang="en-US" sz="1600" dirty="0" err="1" smtClean="0"/>
-              <a:t>enemigo</a:t>
-            </a:r>
-            <a:r>
-              <a:rPr lang="en-US" sz="1600" dirty="0" smtClean="0"/>
-              <a:t>.</a:t>
-            </a:r>
-          </a:p>
-          <a:p>
-            <a:r>
-              <a:rPr lang="en-US" sz="1600" dirty="0"/>
-              <a:t>	</a:t>
-            </a:r>
-            <a:r>
-              <a:rPr lang="en-US" sz="1600" dirty="0" smtClean="0"/>
-              <a:t>		- “</a:t>
-            </a:r>
-            <a:r>
-              <a:rPr lang="en-US" sz="1600" dirty="0" err="1" smtClean="0"/>
-              <a:t>Toca</a:t>
-            </a:r>
-            <a:r>
-              <a:rPr lang="en-US" sz="1600" dirty="0" smtClean="0"/>
-              <a:t>” el  </a:t>
-            </a:r>
-            <a:r>
-              <a:rPr lang="en-US" sz="1600" dirty="0" err="1" smtClean="0"/>
-              <a:t>océano</a:t>
-            </a:r>
-            <a:r>
-              <a:rPr lang="en-US" sz="1600" dirty="0" smtClean="0"/>
-              <a:t>.</a:t>
-            </a:r>
-          </a:p>
-          <a:p>
-            <a:endParaRPr lang="en-US" sz="1600" dirty="0"/>
-          </a:p>
-          <a:p>
-            <a:endParaRPr lang="en-US" sz="2400" dirty="0" smtClean="0"/>
-          </a:p>
-        </p:txBody>
-      </p:sp>
-      <p:pic>
-        <p:nvPicPr>
-          <p:cNvPr id="5" name="Imagen 4"/>
-          <p:cNvPicPr>
-            <a:picLocks noChangeAspect="1"/>
-          </p:cNvPicPr>
-          <p:nvPr/>
-        </p:nvPicPr>
-        <p:blipFill>
-          <a:blip r:embed="rId4" cstate="print">
-            <a:extLst>
-              <a:ext uri="{28A0092B-C50C-407E-A947-70E740481C1C}">
-                <a14:useLocalDpi xmlns:a14="http://schemas.microsoft.com/office/drawing/2010/main" val="0"/>
-              </a:ext>
-            </a:extLst>
-          </a:blip>
-          <a:stretch>
-            <a:fillRect/>
-          </a:stretch>
-        </p:blipFill>
-        <p:spPr>
-          <a:xfrm>
-            <a:off x="906605" y="4360452"/>
-            <a:ext cx="3615526" cy="2352320"/>
-          </a:xfrm>
-          <a:prstGeom prst="rect">
-            <a:avLst/>
-          </a:prstGeom>
-        </p:spPr>
-      </p:pic>
-      <p:pic>
-        <p:nvPicPr>
-          <p:cNvPr id="4" name="Cortina_Vision7">
-            <a:hlinkClick r:id="" action="ppaction://media"/>
-          </p:cNvPr>
-          <p:cNvPicPr>
-            <a:picLocks noChangeAspect="1"/>
-          </p:cNvPicPr>
-          <p:nvPr>
-            <a:audioFile r:link="rId2"/>
-            <p:extLst>
-              <p:ext uri="{DAA4B4D4-6D71-4841-9C94-3DE7FCFB9230}">
-                <p14:media xmlns:p14="http://schemas.microsoft.com/office/powerpoint/2010/main" r:embed="rId1"/>
-              </p:ext>
-            </p:extLst>
-          </p:nvPr>
-        </p:nvPicPr>
-        <p:blipFill>
-          <a:blip r:embed="rId5"/>
-          <a:stretch>
-            <a:fillRect/>
-          </a:stretch>
-        </p:blipFill>
-        <p:spPr>
-          <a:xfrm>
-            <a:off x="5791200" y="3124200"/>
-            <a:ext cx="609600" cy="609600"/>
-          </a:xfrm>
-          <a:prstGeom prst="rect">
-            <a:avLst/>
-          </a:prstGeom>
-        </p:spPr>
-      </p:pic>
-    </p:spTree>
-    <p:extLst>
-      <p:ext uri="{BB962C8B-B14F-4D97-AF65-F5344CB8AC3E}">
-        <p14:creationId xmlns:p14="http://schemas.microsoft.com/office/powerpoint/2010/main" val="222273743"/>
-      </p:ext>
-    </p:extLst>
-  </p:cSld>
-  <p:clrMapOvr>
-    <a:masterClrMapping/>
-  </p:clrMapOvr>
-  <p:timing>
-    <p:tnLst>
-      <p:par>
-        <p:cTn id="1" dur="indefinite" restart="never" nodeType="tmRoot">
-          <p:childTnLst>
-            <p:seq concurrent="1" nextAc="seek">
-              <p:cTn id="2" dur="indefinite" nodeType="mainSeq">
-                <p:childTnLst>
-                  <p:par>
-                    <p:cTn id="3" fill="hold">
-                      <p:stCondLst>
-                        <p:cond delay="indefinite"/>
-                        <p:cond evt="onBegin" delay="0">
-                          <p:tn val="2"/>
-                        </p:cond>
-                      </p:stCondLst>
-                      <p:childTnLst>
-                        <p:par>
-                          <p:cTn id="4" fill="hold">
-                            <p:stCondLst>
-                              <p:cond delay="0"/>
-                            </p:stCondLst>
-                            <p:childTnLst>
-                              <p:par>
-                                <p:cTn id="5" presetID="1" presetClass="mediacall" presetSubtype="0" fill="hold" nodeType="afterEffect">
-                                  <p:stCondLst>
-                                    <p:cond delay="0"/>
-                                  </p:stCondLst>
-                                  <p:childTnLst>
-                                    <p:cmd type="call" cmd="playFrom(0.0)">
-                                      <p:cBhvr>
-                                        <p:cTn id="6" dur="38896" fill="hold"/>
-                                        <p:tgtEl>
-                                          <p:spTgt spid="4"/>
-                                        </p:tgtEl>
-                                      </p:cBhvr>
-                                    </p:cmd>
-                                  </p:childTnLst>
-                                </p:cTn>
-                              </p:par>
-                            </p:childTnLst>
-                          </p:cTn>
-                        </p:par>
-                      </p:childTnLst>
-                    </p:cTn>
-                  </p:par>
-                </p:childTnLst>
-              </p:cTn>
-              <p:prevCondLst>
-                <p:cond evt="onPrev" delay="0">
-                  <p:tgtEl>
-                    <p:sldTgt/>
-                  </p:tgtEl>
-                </p:cond>
-              </p:prevCondLst>
-              <p:nextCondLst>
-                <p:cond evt="onNext" delay="0">
-                  <p:tgtEl>
-                    <p:sldTgt/>
-                  </p:tgtEl>
-                </p:cond>
-              </p:nextCondLst>
-            </p:seq>
-            <p:audio>
-              <p:cMediaNode vol="80000" showWhenStopped="0">
-                <p:cTn id="7" fill="hold" display="0">
-                  <p:stCondLst>
-                    <p:cond delay="indefinite"/>
-                  </p:stCondLst>
-                  <p:endCondLst>
-                    <p:cond evt="onStopAudio" delay="0">
-                      <p:tgtEl>
-                        <p:sldTgt/>
-                      </p:tgtEl>
-                    </p:cond>
-                  </p:endCondLst>
-                </p:cTn>
-                <p:tgtEl>
-                  <p:spTgt spid="4"/>
-                </p:tgtEl>
-              </p:cMediaNode>
-            </p:audio>
-          </p:childTnLst>
-        </p:cTn>
-      </p:par>
-    </p:tnLst>
-  </p:timing>
-</p:sld>
-</file>
-
-<file path=ppt/slides/slide3.xml><?xml version="1.0" encoding="utf-8"?>
 <p:sld xmlns:a="http://schemas.openxmlformats.org/drawingml/2006/main" xmlns:r="http://schemas.openxmlformats.org/officeDocument/2006/relationships" xmlns:p="http://schemas.openxmlformats.org/presentationml/2006/main">
   <p:cSld>
     <p:spTree>
@@ -5442,1070 +4726,7 @@
     </p:spTree>
     <p:extLst>
       <p:ext uri="{BB962C8B-B14F-4D97-AF65-F5344CB8AC3E}">
-        <p14:creationId xmlns:p14="http://schemas.microsoft.com/office/powerpoint/2010/main" val="1973196567"/>
-      </p:ext>
-    </p:extLst>
-  </p:cSld>
-  <p:clrMapOvr>
-    <a:masterClrMapping/>
-  </p:clrMapOvr>
-  <p:timing>
-    <p:tnLst>
-      <p:par>
-        <p:cTn id="1" dur="indefinite" restart="never" nodeType="tmRoot">
-          <p:childTnLst>
-            <p:seq concurrent="1" nextAc="seek">
-              <p:cTn id="2" dur="indefinite" nodeType="mainSeq">
-                <p:childTnLst>
-                  <p:par>
-                    <p:cTn id="3" fill="hold">
-                      <p:stCondLst>
-                        <p:cond delay="indefinite"/>
-                        <p:cond evt="onBegin" delay="0">
-                          <p:tn val="2"/>
-                        </p:cond>
-                      </p:stCondLst>
-                      <p:childTnLst>
-                        <p:par>
-                          <p:cTn id="4" fill="hold">
-                            <p:stCondLst>
-                              <p:cond delay="0"/>
-                            </p:stCondLst>
-                            <p:childTnLst>
-                              <p:par>
-                                <p:cTn id="5" presetID="1" presetClass="mediacall" presetSubtype="0" fill="hold" nodeType="afterEffect">
-                                  <p:stCondLst>
-                                    <p:cond delay="0"/>
-                                  </p:stCondLst>
-                                  <p:childTnLst>
-                                    <p:cmd type="call" cmd="playFrom(0.0)">
-                                      <p:cBhvr>
-                                        <p:cTn id="6" dur="38896" fill="hold"/>
-                                        <p:tgtEl>
-                                          <p:spTgt spid="5"/>
-                                        </p:tgtEl>
-                                      </p:cBhvr>
-                                    </p:cmd>
-                                  </p:childTnLst>
-                                </p:cTn>
-                              </p:par>
-                            </p:childTnLst>
-                          </p:cTn>
-                        </p:par>
-                      </p:childTnLst>
-                    </p:cTn>
-                  </p:par>
-                </p:childTnLst>
-              </p:cTn>
-              <p:prevCondLst>
-                <p:cond evt="onPrev" delay="0">
-                  <p:tgtEl>
-                    <p:sldTgt/>
-                  </p:tgtEl>
-                </p:cond>
-              </p:prevCondLst>
-              <p:nextCondLst>
-                <p:cond evt="onNext" delay="0">
-                  <p:tgtEl>
-                    <p:sldTgt/>
-                  </p:tgtEl>
-                </p:cond>
-              </p:nextCondLst>
-            </p:seq>
-            <p:audio>
-              <p:cMediaNode vol="80000" showWhenStopped="0">
-                <p:cTn id="7" fill="hold" display="0">
-                  <p:stCondLst>
-                    <p:cond delay="indefinite"/>
-                  </p:stCondLst>
-                  <p:endCondLst>
-                    <p:cond evt="onStopAudio" delay="0">
-                      <p:tgtEl>
-                        <p:sldTgt/>
-                      </p:tgtEl>
-                    </p:cond>
-                  </p:endCondLst>
-                </p:cTn>
-                <p:tgtEl>
-                  <p:spTgt spid="5"/>
-                </p:tgtEl>
-              </p:cMediaNode>
-            </p:audio>
-          </p:childTnLst>
-        </p:cTn>
-      </p:par>
-    </p:tnLst>
-  </p:timing>
-</p:sld>
-</file>
-
-<file path=ppt/slides/slide4.xml><?xml version="1.0" encoding="utf-8"?>
-<p:sld xmlns:a="http://schemas.openxmlformats.org/drawingml/2006/main" xmlns:r="http://schemas.openxmlformats.org/officeDocument/2006/relationships" xmlns:p="http://schemas.openxmlformats.org/presentationml/2006/main">
-  <p:cSld>
-    <p:spTree>
-      <p:nvGrpSpPr>
-        <p:cNvPr id="1" name=""/>
-        <p:cNvGrpSpPr/>
-        <p:nvPr/>
-      </p:nvGrpSpPr>
-      <p:grpSpPr>
-        <a:xfrm>
-          <a:off x="0" y="0"/>
-          <a:ext cx="0" cy="0"/>
-          <a:chOff x="0" y="0"/>
-          <a:chExt cx="0" cy="0"/>
-        </a:xfrm>
-      </p:grpSpPr>
-      <p:sp>
-        <p:nvSpPr>
-          <p:cNvPr id="2" name="Título 1"/>
-          <p:cNvSpPr>
-            <a:spLocks noGrp="1"/>
-          </p:cNvSpPr>
-          <p:nvPr>
-            <p:ph type="ctrTitle"/>
-          </p:nvPr>
-        </p:nvSpPr>
-        <p:spPr/>
-        <p:txBody>
-          <a:bodyPr>
-            <a:normAutofit fontScale="90000"/>
-          </a:bodyPr>
-          <a:lstStyle/>
-          <a:p>
-            <a:r>
-              <a:rPr lang="en-US" sz="2700" dirty="0" smtClean="0">
-                <a:latin typeface="OCR A Extended" panose="02010509020102010303" pitchFamily="50" charset="0"/>
-              </a:rPr>
-              <a:t>1982</a:t>
-            </a:r>
-            <a:r>
-              <a:rPr lang="en-US" dirty="0" smtClean="0">
-                <a:latin typeface="OCR A Extended" panose="02010509020102010303" pitchFamily="50" charset="0"/>
-              </a:rPr>
-              <a:t/>
-            </a:r>
-            <a:br>
-              <a:rPr lang="en-US" dirty="0" smtClean="0">
-                <a:latin typeface="OCR A Extended" panose="02010509020102010303" pitchFamily="50" charset="0"/>
-              </a:rPr>
-            </a:br>
-            <a:r>
-              <a:rPr lang="en-US" sz="3100" dirty="0" smtClean="0">
-                <a:latin typeface="OCR A Extended" panose="02010509020102010303" pitchFamily="50" charset="0"/>
-              </a:rPr>
-              <a:t>30 de mayo</a:t>
-            </a:r>
-            <a:r>
-              <a:rPr lang="en-US" dirty="0" smtClean="0">
-                <a:latin typeface="OCR A Extended" panose="02010509020102010303" pitchFamily="50" charset="0"/>
-              </a:rPr>
-              <a:t/>
-            </a:r>
-            <a:br>
-              <a:rPr lang="en-US" dirty="0" smtClean="0">
-                <a:latin typeface="OCR A Extended" panose="02010509020102010303" pitchFamily="50" charset="0"/>
-              </a:rPr>
-            </a:br>
-            <a:r>
-              <a:rPr lang="en-US" dirty="0" smtClean="0">
-                <a:latin typeface="OCR A Extended" panose="02010509020102010303" pitchFamily="50" charset="0"/>
-              </a:rPr>
-              <a:t>“</a:t>
-            </a:r>
-            <a:r>
-              <a:rPr lang="en-US" dirty="0" err="1" smtClean="0">
-                <a:latin typeface="OCR A Extended" panose="02010509020102010303" pitchFamily="50" charset="0"/>
-              </a:rPr>
-              <a:t>ataque</a:t>
-            </a:r>
-            <a:r>
-              <a:rPr lang="en-US" dirty="0" smtClean="0">
-                <a:latin typeface="OCR A Extended" panose="02010509020102010303" pitchFamily="50" charset="0"/>
-              </a:rPr>
-              <a:t> al </a:t>
-            </a:r>
-            <a:r>
-              <a:rPr lang="en-US" dirty="0" err="1" smtClean="0">
-                <a:latin typeface="OCR A Extended" panose="02010509020102010303" pitchFamily="50" charset="0"/>
-              </a:rPr>
-              <a:t>portaaviones</a:t>
-            </a:r>
-            <a:r>
-              <a:rPr lang="en-US" dirty="0" smtClean="0">
-                <a:latin typeface="OCR A Extended" panose="02010509020102010303" pitchFamily="50" charset="0"/>
-              </a:rPr>
-              <a:t>”</a:t>
-            </a:r>
-            <a:endParaRPr lang="es-AR" dirty="0">
-              <a:latin typeface="OCR A Extended" panose="02010509020102010303" pitchFamily="50" charset="0"/>
-            </a:endParaRPr>
-          </a:p>
-        </p:txBody>
-      </p:sp>
-      <p:sp>
-        <p:nvSpPr>
-          <p:cNvPr id="3" name="Subtítulo 2"/>
-          <p:cNvSpPr>
-            <a:spLocks noGrp="1"/>
-          </p:cNvSpPr>
-          <p:nvPr>
-            <p:ph type="subTitle" idx="1"/>
-          </p:nvPr>
-        </p:nvSpPr>
-        <p:spPr>
-          <a:xfrm>
-            <a:off x="4464285" y="4360452"/>
-            <a:ext cx="6680637" cy="2497548"/>
-          </a:xfrm>
-        </p:spPr>
-        <p:txBody>
-          <a:bodyPr>
-            <a:normAutofit fontScale="77500" lnSpcReduction="20000"/>
-          </a:bodyPr>
-          <a:lstStyle/>
-          <a:p>
-            <a:r>
-              <a:rPr lang="en-US" sz="1600" b="1" dirty="0" err="1" smtClean="0"/>
-              <a:t>Avión</a:t>
-            </a:r>
-            <a:r>
-              <a:rPr lang="en-US" sz="1600" b="1" dirty="0" smtClean="0"/>
-              <a:t> de la </a:t>
-            </a:r>
-            <a:r>
-              <a:rPr lang="en-US" sz="1600" b="1" dirty="0" err="1" smtClean="0"/>
-              <a:t>misión</a:t>
-            </a:r>
-            <a:r>
-              <a:rPr lang="en-US" sz="1600" b="1" dirty="0" smtClean="0"/>
-              <a:t>:</a:t>
-            </a:r>
-            <a:r>
-              <a:rPr lang="en-US" sz="1600" dirty="0" smtClean="0"/>
-              <a:t> Douglas A-4C Skyhawk, </a:t>
-            </a:r>
-            <a:r>
-              <a:rPr lang="en-US" sz="1600" dirty="0" err="1" smtClean="0"/>
-              <a:t>perteneciente</a:t>
-            </a:r>
-            <a:r>
-              <a:rPr lang="en-US" sz="1600" dirty="0" smtClean="0"/>
-              <a:t> a la IV </a:t>
-            </a:r>
-            <a:r>
-              <a:rPr lang="en-US" sz="1600" dirty="0" err="1" smtClean="0"/>
-              <a:t>Brigada</a:t>
-            </a:r>
-            <a:r>
-              <a:rPr lang="en-US" sz="1600" dirty="0" smtClean="0"/>
-              <a:t> </a:t>
-            </a:r>
-            <a:r>
-              <a:rPr lang="en-US" sz="1600" dirty="0" err="1" smtClean="0"/>
-              <a:t>Aérea</a:t>
-            </a:r>
-            <a:r>
-              <a:rPr lang="en-US" sz="1600" dirty="0" smtClean="0"/>
-              <a:t> de la FAA.</a:t>
-            </a:r>
-          </a:p>
-          <a:p>
-            <a:r>
-              <a:rPr lang="en-US" sz="1600" b="1" dirty="0" err="1" smtClean="0"/>
-              <a:t>Contexto</a:t>
-            </a:r>
-            <a:r>
-              <a:rPr lang="en-US" sz="1600" b="1" dirty="0" smtClean="0"/>
-              <a:t> / </a:t>
-            </a:r>
-            <a:r>
-              <a:rPr lang="en-US" sz="1600" b="1" dirty="0" err="1" smtClean="0"/>
-              <a:t>Situación</a:t>
-            </a:r>
-            <a:r>
-              <a:rPr lang="en-US" sz="1600" b="1" dirty="0" smtClean="0"/>
-              <a:t> </a:t>
-            </a:r>
-            <a:r>
-              <a:rPr lang="en-US" sz="1600" b="1" dirty="0" err="1" smtClean="0"/>
-              <a:t>táctica</a:t>
-            </a:r>
-            <a:r>
-              <a:rPr lang="en-US" sz="1600" b="1" dirty="0" smtClean="0"/>
-              <a:t>: </a:t>
-            </a:r>
-            <a:r>
-              <a:rPr lang="en-US" sz="1600" dirty="0" err="1" smtClean="0"/>
-              <a:t>Dejar</a:t>
-            </a:r>
-            <a:r>
-              <a:rPr lang="en-US" sz="1600" dirty="0" smtClean="0"/>
-              <a:t> </a:t>
-            </a:r>
-            <a:r>
-              <a:rPr lang="en-US" sz="1600" dirty="0" err="1" smtClean="0"/>
-              <a:t>fuera</a:t>
-            </a:r>
-            <a:r>
-              <a:rPr lang="en-US" sz="1600" dirty="0" smtClean="0"/>
-              <a:t> de </a:t>
-            </a:r>
-            <a:r>
-              <a:rPr lang="en-US" sz="1600" dirty="0" err="1" smtClean="0"/>
-              <a:t>combate</a:t>
-            </a:r>
-            <a:r>
-              <a:rPr lang="en-US" sz="1600" dirty="0" smtClean="0"/>
-              <a:t> a 1 de </a:t>
-            </a:r>
-            <a:r>
-              <a:rPr lang="en-US" sz="1600" dirty="0" err="1" smtClean="0"/>
-              <a:t>los</a:t>
-            </a:r>
-            <a:r>
-              <a:rPr lang="en-US" sz="1600" dirty="0" smtClean="0"/>
-              <a:t> 3 </a:t>
-            </a:r>
-            <a:r>
-              <a:rPr lang="en-US" sz="1600" dirty="0" err="1" smtClean="0"/>
-              <a:t>portaaviones</a:t>
-            </a:r>
-            <a:r>
-              <a:rPr lang="en-US" sz="1600" dirty="0" smtClean="0"/>
-              <a:t> de la Royal Navy (2 de </a:t>
-            </a:r>
-            <a:r>
-              <a:rPr lang="en-US" sz="1600" dirty="0" err="1" smtClean="0"/>
-              <a:t>ellos</a:t>
-            </a:r>
-            <a:r>
-              <a:rPr lang="en-US" sz="1600" dirty="0" smtClean="0"/>
-              <a:t> </a:t>
-            </a:r>
-            <a:r>
-              <a:rPr lang="en-US" sz="1600" dirty="0" err="1" smtClean="0"/>
-              <a:t>enviados</a:t>
-            </a:r>
-            <a:r>
-              <a:rPr lang="en-US" sz="1600" dirty="0" smtClean="0"/>
-              <a:t> a la guerra) </a:t>
-            </a:r>
-            <a:r>
-              <a:rPr lang="en-US" sz="1600" dirty="0" err="1" smtClean="0"/>
-              <a:t>daría</a:t>
-            </a:r>
-            <a:r>
-              <a:rPr lang="en-US" sz="1600" dirty="0" smtClean="0"/>
-              <a:t> un </a:t>
-            </a:r>
-            <a:r>
-              <a:rPr lang="en-US" sz="1600" dirty="0" err="1" smtClean="0"/>
-              <a:t>respiro</a:t>
-            </a:r>
-            <a:r>
-              <a:rPr lang="en-US" sz="1600" dirty="0" smtClean="0"/>
-              <a:t> a la FAA y al EA, sin </a:t>
-            </a:r>
-            <a:r>
-              <a:rPr lang="en-US" sz="1600" dirty="0" err="1" smtClean="0"/>
-              <a:t>contar</a:t>
-            </a:r>
-            <a:r>
-              <a:rPr lang="en-US" sz="1600" dirty="0" smtClean="0"/>
-              <a:t> la </a:t>
-            </a:r>
-            <a:r>
-              <a:rPr lang="en-US" sz="1600" dirty="0" err="1" smtClean="0"/>
-              <a:t>suba</a:t>
-            </a:r>
-            <a:r>
-              <a:rPr lang="en-US" sz="1600" dirty="0" smtClean="0"/>
-              <a:t> de moral. </a:t>
-            </a:r>
-            <a:r>
-              <a:rPr lang="en-US" sz="1600" dirty="0" err="1" smtClean="0"/>
-              <a:t>Además</a:t>
-            </a:r>
-            <a:r>
-              <a:rPr lang="en-US" sz="1600" dirty="0" smtClean="0"/>
-              <a:t>, el </a:t>
-            </a:r>
-            <a:r>
-              <a:rPr lang="en-US" sz="1600" dirty="0" err="1" smtClean="0"/>
-              <a:t>perder</a:t>
-            </a:r>
-            <a:r>
-              <a:rPr lang="en-US" sz="1600" dirty="0" smtClean="0"/>
-              <a:t> </a:t>
-            </a:r>
-            <a:r>
-              <a:rPr lang="en-US" sz="1600" dirty="0" err="1" smtClean="0"/>
-              <a:t>una</a:t>
-            </a:r>
-            <a:r>
-              <a:rPr lang="en-US" sz="1600" dirty="0" smtClean="0"/>
-              <a:t> </a:t>
-            </a:r>
-            <a:r>
-              <a:rPr lang="en-US" sz="1600" dirty="0" err="1" smtClean="0"/>
-              <a:t>unidad</a:t>
-            </a:r>
-            <a:r>
-              <a:rPr lang="en-US" sz="1600" dirty="0" smtClean="0"/>
-              <a:t> naval de tan </a:t>
-            </a:r>
-            <a:r>
-              <a:rPr lang="en-US" sz="1600" dirty="0" err="1" smtClean="0"/>
-              <a:t>importantísimo</a:t>
-            </a:r>
-            <a:r>
-              <a:rPr lang="en-US" sz="1600" dirty="0" smtClean="0"/>
-              <a:t> valor, </a:t>
-            </a:r>
-            <a:r>
-              <a:rPr lang="en-US" sz="1600" dirty="0" err="1" smtClean="0"/>
-              <a:t>por</a:t>
-            </a:r>
-            <a:r>
-              <a:rPr lang="en-US" sz="1600" dirty="0" smtClean="0"/>
-              <a:t> </a:t>
-            </a:r>
-            <a:r>
-              <a:rPr lang="en-US" sz="1600" dirty="0" err="1" smtClean="0"/>
-              <a:t>sobre</a:t>
-            </a:r>
-            <a:r>
-              <a:rPr lang="en-US" sz="1600" dirty="0" smtClean="0"/>
-              <a:t> </a:t>
-            </a:r>
-            <a:r>
-              <a:rPr lang="en-US" sz="1600" dirty="0" err="1" smtClean="0"/>
-              <a:t>todo</a:t>
-            </a:r>
-            <a:r>
-              <a:rPr lang="en-US" sz="1600" dirty="0" smtClean="0"/>
-              <a:t> </a:t>
-            </a:r>
-            <a:r>
-              <a:rPr lang="en-US" sz="1600" dirty="0" err="1" smtClean="0"/>
-              <a:t>impactaría</a:t>
-            </a:r>
-            <a:r>
-              <a:rPr lang="en-US" sz="1600" dirty="0" smtClean="0"/>
-              <a:t> a </a:t>
-            </a:r>
-            <a:r>
-              <a:rPr lang="en-US" sz="1600" dirty="0" err="1" smtClean="0"/>
-              <a:t>nivel</a:t>
-            </a:r>
-            <a:r>
-              <a:rPr lang="en-US" sz="1600" dirty="0" smtClean="0"/>
-              <a:t> politico </a:t>
-            </a:r>
-            <a:r>
-              <a:rPr lang="en-US" sz="1600" dirty="0" err="1" smtClean="0"/>
-              <a:t>en</a:t>
-            </a:r>
-            <a:r>
-              <a:rPr lang="en-US" sz="1600" dirty="0" smtClean="0"/>
-              <a:t> </a:t>
-            </a:r>
-            <a:r>
-              <a:rPr lang="en-US" sz="1600" dirty="0" err="1" smtClean="0"/>
-              <a:t>Reino</a:t>
-            </a:r>
-            <a:r>
-              <a:rPr lang="en-US" sz="1600" dirty="0" smtClean="0"/>
-              <a:t> </a:t>
-            </a:r>
-            <a:r>
-              <a:rPr lang="en-US" sz="1600" dirty="0" err="1" smtClean="0"/>
-              <a:t>Unido</a:t>
-            </a:r>
-            <a:r>
-              <a:rPr lang="en-US" sz="1600" dirty="0" smtClean="0"/>
-              <a:t>, </a:t>
-            </a:r>
-            <a:r>
-              <a:rPr lang="en-US" sz="1600" dirty="0" smtClean="0"/>
-              <a:t>principal </a:t>
-            </a:r>
-            <a:r>
-              <a:rPr lang="en-US" sz="1600" dirty="0" err="1" smtClean="0"/>
-              <a:t>responsable</a:t>
-            </a:r>
-            <a:r>
-              <a:rPr lang="en-US" sz="1600" dirty="0" smtClean="0"/>
-              <a:t> de </a:t>
-            </a:r>
-            <a:r>
-              <a:rPr lang="en-US" sz="1600" dirty="0" err="1" smtClean="0"/>
-              <a:t>garantizar</a:t>
-            </a:r>
-            <a:r>
-              <a:rPr lang="en-US" sz="1600" dirty="0" smtClean="0"/>
-              <a:t> la </a:t>
-            </a:r>
-            <a:r>
-              <a:rPr lang="en-US" sz="1600" dirty="0" err="1" smtClean="0"/>
-              <a:t>seguridad</a:t>
-            </a:r>
-            <a:r>
-              <a:rPr lang="en-US" sz="1600" dirty="0" smtClean="0"/>
-              <a:t> </a:t>
-            </a:r>
-            <a:r>
-              <a:rPr lang="en-US" sz="1600" dirty="0" err="1" smtClean="0"/>
-              <a:t>en</a:t>
-            </a:r>
-            <a:r>
-              <a:rPr lang="en-US" sz="1600" dirty="0" smtClean="0"/>
-              <a:t> </a:t>
-            </a:r>
-            <a:r>
-              <a:rPr lang="en-US" sz="1600" dirty="0" err="1" smtClean="0"/>
-              <a:t>su</a:t>
-            </a:r>
-            <a:r>
-              <a:rPr lang="en-US" sz="1600" dirty="0" smtClean="0"/>
-              <a:t> </a:t>
-            </a:r>
-            <a:r>
-              <a:rPr lang="en-US" sz="1600" dirty="0" err="1" smtClean="0"/>
-              <a:t>continente</a:t>
-            </a:r>
-            <a:r>
-              <a:rPr lang="en-US" sz="1600" dirty="0" smtClean="0"/>
-              <a:t> </a:t>
-            </a:r>
-            <a:r>
-              <a:rPr lang="en-US" sz="1600" dirty="0" err="1" smtClean="0"/>
-              <a:t>en</a:t>
-            </a:r>
-            <a:r>
-              <a:rPr lang="en-US" sz="1600" dirty="0" smtClean="0"/>
-              <a:t> </a:t>
-            </a:r>
-            <a:r>
-              <a:rPr lang="en-US" sz="1600" dirty="0" err="1" smtClean="0"/>
-              <a:t>medio</a:t>
-            </a:r>
-            <a:r>
-              <a:rPr lang="en-US" sz="1600" dirty="0"/>
-              <a:t> </a:t>
-            </a:r>
-            <a:r>
-              <a:rPr lang="en-US" sz="1600" dirty="0" smtClean="0"/>
-              <a:t>de la Guerra </a:t>
-            </a:r>
-            <a:r>
-              <a:rPr lang="en-US" sz="1600" dirty="0" err="1" smtClean="0"/>
-              <a:t>Fría</a:t>
-            </a:r>
-            <a:r>
-              <a:rPr lang="en-US" sz="1600" dirty="0" smtClean="0"/>
-              <a:t>. No </a:t>
-            </a:r>
-            <a:r>
-              <a:rPr lang="en-US" sz="1600" dirty="0" err="1" smtClean="0"/>
-              <a:t>sería</a:t>
-            </a:r>
-            <a:r>
-              <a:rPr lang="en-US" sz="1600" dirty="0" smtClean="0"/>
-              <a:t> </a:t>
-            </a:r>
-            <a:r>
-              <a:rPr lang="en-US" sz="1600" dirty="0" err="1" smtClean="0"/>
-              <a:t>extraño</a:t>
-            </a:r>
-            <a:r>
-              <a:rPr lang="en-US" sz="1600" dirty="0" smtClean="0"/>
-              <a:t> </a:t>
-            </a:r>
-            <a:r>
-              <a:rPr lang="en-US" sz="1600" dirty="0" err="1" smtClean="0"/>
-              <a:t>volver</a:t>
-            </a:r>
-            <a:r>
-              <a:rPr lang="en-US" sz="1600" dirty="0" smtClean="0"/>
-              <a:t> a </a:t>
-            </a:r>
-            <a:r>
-              <a:rPr lang="en-US" sz="1600" dirty="0" err="1" smtClean="0"/>
-              <a:t>hablar</a:t>
-            </a:r>
-            <a:r>
-              <a:rPr lang="en-US" sz="1600" dirty="0" smtClean="0"/>
-              <a:t> de un “alto el </a:t>
-            </a:r>
-            <a:r>
-              <a:rPr lang="en-US" sz="1600" dirty="0" err="1" smtClean="0"/>
-              <a:t>fuego</a:t>
-            </a:r>
-            <a:r>
-              <a:rPr lang="en-US" sz="1600" dirty="0" smtClean="0"/>
-              <a:t>”. </a:t>
-            </a:r>
-            <a:r>
-              <a:rPr lang="en-US" sz="1600" dirty="0" err="1" smtClean="0"/>
-              <a:t>Conscientes</a:t>
-            </a:r>
-            <a:r>
-              <a:rPr lang="en-US" sz="1600" dirty="0" smtClean="0"/>
-              <a:t> de </a:t>
-            </a:r>
-            <a:r>
-              <a:rPr lang="en-US" sz="1600" dirty="0" err="1" smtClean="0"/>
-              <a:t>aquello</a:t>
-            </a:r>
-            <a:r>
-              <a:rPr lang="en-US" sz="1600" dirty="0" smtClean="0"/>
-              <a:t>, la Armada y la </a:t>
-            </a:r>
-            <a:r>
-              <a:rPr lang="en-US" sz="1600" dirty="0" err="1" smtClean="0"/>
-              <a:t>Fuerza</a:t>
-            </a:r>
-            <a:r>
-              <a:rPr lang="en-US" sz="1600" dirty="0" smtClean="0"/>
-              <a:t> </a:t>
-            </a:r>
-            <a:r>
-              <a:rPr lang="en-US" sz="1600" dirty="0" err="1" smtClean="0"/>
-              <a:t>Aérea</a:t>
-            </a:r>
-            <a:r>
-              <a:rPr lang="en-US" sz="1600" dirty="0" smtClean="0"/>
-              <a:t> </a:t>
-            </a:r>
-            <a:r>
-              <a:rPr lang="en-US" sz="1600" dirty="0" err="1" smtClean="0"/>
-              <a:t>planificarán</a:t>
-            </a:r>
-            <a:r>
-              <a:rPr lang="en-US" sz="1600" dirty="0" smtClean="0"/>
-              <a:t> </a:t>
-            </a:r>
-            <a:r>
-              <a:rPr lang="en-US" sz="1600" dirty="0" err="1" smtClean="0"/>
-              <a:t>en</a:t>
-            </a:r>
-            <a:r>
-              <a:rPr lang="en-US" sz="1600" dirty="0" smtClean="0"/>
-              <a:t> </a:t>
-            </a:r>
-            <a:r>
-              <a:rPr lang="en-US" sz="1600" dirty="0" err="1" smtClean="0"/>
-              <a:t>conjunto</a:t>
-            </a:r>
-            <a:r>
-              <a:rPr lang="en-US" sz="1600" dirty="0" smtClean="0"/>
-              <a:t> un </a:t>
-            </a:r>
-            <a:r>
-              <a:rPr lang="en-US" sz="1600" dirty="0" err="1" smtClean="0"/>
-              <a:t>ataque</a:t>
-            </a:r>
-            <a:r>
-              <a:rPr lang="en-US" sz="1600" dirty="0" smtClean="0"/>
-              <a:t> </a:t>
-            </a:r>
-            <a:r>
-              <a:rPr lang="en-US" sz="1600" dirty="0" err="1" smtClean="0"/>
-              <a:t>estratégico</a:t>
-            </a:r>
-            <a:r>
-              <a:rPr lang="en-US" sz="1600" dirty="0" smtClean="0"/>
-              <a:t> contra el </a:t>
-            </a:r>
-            <a:r>
-              <a:rPr lang="en-US" sz="1600" dirty="0" err="1" smtClean="0"/>
-              <a:t>portaaviones</a:t>
-            </a:r>
-            <a:r>
-              <a:rPr lang="en-US" sz="1600" dirty="0" smtClean="0"/>
-              <a:t> HMS </a:t>
-            </a:r>
-            <a:r>
-              <a:rPr lang="en-US" sz="1600" dirty="0" err="1" smtClean="0"/>
-              <a:t>Invencible</a:t>
-            </a:r>
-            <a:r>
-              <a:rPr lang="en-US" sz="1600" dirty="0" smtClean="0"/>
-              <a:t>. Se </a:t>
-            </a:r>
-            <a:r>
-              <a:rPr lang="en-US" sz="1600" dirty="0" err="1" smtClean="0"/>
-              <a:t>contará</a:t>
-            </a:r>
-            <a:r>
-              <a:rPr lang="en-US" sz="1600" dirty="0" smtClean="0"/>
-              <a:t> con el factor </a:t>
-            </a:r>
-            <a:r>
-              <a:rPr lang="en-US" sz="1600" dirty="0" err="1" smtClean="0"/>
-              <a:t>sorpresa</a:t>
-            </a:r>
-            <a:r>
-              <a:rPr lang="en-US" sz="1600" dirty="0" smtClean="0"/>
-              <a:t>.</a:t>
-            </a:r>
-          </a:p>
-          <a:p>
-            <a:r>
-              <a:rPr lang="en-US" sz="1600" b="1" dirty="0" err="1" smtClean="0"/>
-              <a:t>Objetivo</a:t>
-            </a:r>
-            <a:r>
-              <a:rPr lang="en-US" sz="1600" b="1" dirty="0" smtClean="0"/>
-              <a:t>: </a:t>
-            </a:r>
-            <a:r>
-              <a:rPr lang="en-US" sz="1600" dirty="0" err="1" smtClean="0"/>
-              <a:t>Seguir</a:t>
-            </a:r>
-            <a:r>
-              <a:rPr lang="en-US" sz="1600" dirty="0" smtClean="0"/>
-              <a:t> la </a:t>
-            </a:r>
-            <a:r>
-              <a:rPr lang="en-US" sz="1600" dirty="0" err="1" smtClean="0"/>
-              <a:t>estela</a:t>
-            </a:r>
-            <a:r>
-              <a:rPr lang="en-US" sz="1600" dirty="0" smtClean="0"/>
-              <a:t> </a:t>
-            </a:r>
-            <a:r>
-              <a:rPr lang="en-US" sz="1600" dirty="0" err="1" smtClean="0"/>
-              <a:t>dejada</a:t>
-            </a:r>
-            <a:r>
-              <a:rPr lang="en-US" sz="1600" dirty="0" smtClean="0"/>
-              <a:t> </a:t>
-            </a:r>
-            <a:r>
-              <a:rPr lang="en-US" sz="1600" dirty="0" err="1" smtClean="0"/>
-              <a:t>por</a:t>
-            </a:r>
-            <a:r>
-              <a:rPr lang="en-US" sz="1600" dirty="0" smtClean="0"/>
-              <a:t> el </a:t>
-            </a:r>
-            <a:r>
-              <a:rPr lang="en-US" sz="1600" dirty="0" err="1" smtClean="0"/>
-              <a:t>misil</a:t>
-            </a:r>
-            <a:r>
-              <a:rPr lang="en-US" sz="1600" dirty="0" smtClean="0"/>
-              <a:t> </a:t>
-            </a:r>
-            <a:r>
-              <a:rPr lang="en-US" sz="1600" dirty="0" err="1" smtClean="0"/>
-              <a:t>Exocet</a:t>
-            </a:r>
-            <a:r>
-              <a:rPr lang="en-US" sz="1600" dirty="0" smtClean="0"/>
-              <a:t> </a:t>
-            </a:r>
-            <a:r>
-              <a:rPr lang="en-US" sz="1600" dirty="0" err="1" smtClean="0"/>
-              <a:t>disparado</a:t>
-            </a:r>
-            <a:r>
-              <a:rPr lang="en-US" sz="1600" dirty="0" smtClean="0"/>
-              <a:t> </a:t>
-            </a:r>
-            <a:r>
-              <a:rPr lang="en-US" sz="1600" dirty="0" err="1" smtClean="0"/>
-              <a:t>por</a:t>
-            </a:r>
-            <a:r>
-              <a:rPr lang="en-US" sz="1600" dirty="0" smtClean="0"/>
-              <a:t> el Super </a:t>
-            </a:r>
-            <a:r>
-              <a:rPr lang="en-US" sz="1600" dirty="0" err="1" smtClean="0"/>
-              <a:t>Étendard</a:t>
-            </a:r>
-            <a:r>
-              <a:rPr lang="en-US" sz="1600" dirty="0" smtClean="0"/>
-              <a:t> de la </a:t>
-            </a:r>
-            <a:r>
-              <a:rPr lang="en-US" sz="1600" dirty="0" err="1" smtClean="0"/>
-              <a:t>Aviación</a:t>
-            </a:r>
-            <a:r>
-              <a:rPr lang="en-US" sz="1600" dirty="0" smtClean="0"/>
-              <a:t> Naval y </a:t>
-            </a:r>
-            <a:r>
-              <a:rPr lang="en-US" sz="1600" dirty="0" err="1" smtClean="0"/>
-              <a:t>soltar</a:t>
-            </a:r>
-            <a:r>
-              <a:rPr lang="en-US" sz="1600" dirty="0" smtClean="0"/>
-              <a:t> las </a:t>
-            </a:r>
-            <a:r>
-              <a:rPr lang="en-US" sz="1600" dirty="0" err="1" smtClean="0"/>
-              <a:t>bombas</a:t>
-            </a:r>
-            <a:r>
-              <a:rPr lang="en-US" sz="1600" dirty="0" smtClean="0"/>
-              <a:t> </a:t>
-            </a:r>
-            <a:r>
-              <a:rPr lang="en-US" sz="1600" dirty="0" err="1" smtClean="0"/>
-              <a:t>en</a:t>
-            </a:r>
-            <a:r>
-              <a:rPr lang="en-US" sz="1600" dirty="0" smtClean="0"/>
-              <a:t> el </a:t>
-            </a:r>
-            <a:r>
-              <a:rPr lang="en-US" sz="1600" dirty="0" err="1" smtClean="0"/>
-              <a:t>blanco</a:t>
-            </a:r>
-            <a:r>
-              <a:rPr lang="en-US" sz="1600" dirty="0" smtClean="0"/>
-              <a:t> que </a:t>
-            </a:r>
-            <a:r>
-              <a:rPr lang="en-US" sz="1600" dirty="0" err="1" smtClean="0"/>
-              <a:t>éste</a:t>
-            </a:r>
-            <a:r>
-              <a:rPr lang="en-US" sz="1600" dirty="0" smtClean="0"/>
-              <a:t> </a:t>
-            </a:r>
-            <a:r>
-              <a:rPr lang="en-US" sz="1600" dirty="0" err="1" smtClean="0"/>
-              <a:t>impacte</a:t>
-            </a:r>
-            <a:r>
-              <a:rPr lang="en-US" sz="1600" dirty="0" smtClean="0"/>
-              <a:t>.</a:t>
-            </a:r>
-          </a:p>
-          <a:p>
-            <a:r>
-              <a:rPr lang="en-US" sz="1600" b="1" dirty="0" smtClean="0"/>
-              <a:t>Se </a:t>
-            </a:r>
-            <a:r>
-              <a:rPr lang="en-US" sz="1600" b="1" dirty="0" err="1" smtClean="0"/>
-              <a:t>pierde</a:t>
-            </a:r>
-            <a:r>
-              <a:rPr lang="en-US" sz="1600" b="1" dirty="0" smtClean="0"/>
-              <a:t> </a:t>
-            </a:r>
-            <a:r>
-              <a:rPr lang="en-US" sz="1600" b="1" dirty="0" err="1" smtClean="0"/>
-              <a:t>si</a:t>
-            </a:r>
-            <a:r>
-              <a:rPr lang="en-US" sz="1600" b="1" dirty="0" smtClean="0"/>
-              <a:t> la </a:t>
-            </a:r>
-            <a:r>
-              <a:rPr lang="en-US" sz="1600" b="1" dirty="0" err="1" smtClean="0"/>
-              <a:t>aeronave</a:t>
-            </a:r>
-            <a:r>
-              <a:rPr lang="en-US" sz="1600" b="1" dirty="0" smtClean="0"/>
-              <a:t>:</a:t>
-            </a:r>
-            <a:r>
-              <a:rPr lang="en-US" sz="1600" dirty="0"/>
-              <a:t>	</a:t>
-            </a:r>
-            <a:endParaRPr lang="en-US" sz="1600" dirty="0" smtClean="0"/>
-          </a:p>
-          <a:p>
-            <a:r>
-              <a:rPr lang="en-US" sz="1600" dirty="0" smtClean="0"/>
-              <a:t>- </a:t>
-            </a:r>
-            <a:r>
-              <a:rPr lang="en-US" sz="1600" dirty="0" err="1" smtClean="0"/>
-              <a:t>Es</a:t>
-            </a:r>
-            <a:r>
-              <a:rPr lang="en-US" sz="1600" dirty="0" smtClean="0"/>
-              <a:t> </a:t>
-            </a:r>
-            <a:r>
-              <a:rPr lang="en-US" sz="1600" dirty="0" err="1" smtClean="0"/>
-              <a:t>derribada</a:t>
-            </a:r>
-            <a:r>
-              <a:rPr lang="en-US" sz="1600" dirty="0" smtClean="0"/>
-              <a:t> </a:t>
-            </a:r>
-            <a:r>
-              <a:rPr lang="en-US" sz="1600" dirty="0" err="1" smtClean="0"/>
-              <a:t>por</a:t>
-            </a:r>
-            <a:r>
-              <a:rPr lang="en-US" sz="1600" dirty="0" smtClean="0"/>
-              <a:t> el </a:t>
-            </a:r>
-            <a:r>
-              <a:rPr lang="en-US" sz="1600" dirty="0" err="1" smtClean="0"/>
-              <a:t>fuego</a:t>
-            </a:r>
-            <a:r>
-              <a:rPr lang="en-US" sz="1600" dirty="0" smtClean="0"/>
-              <a:t> </a:t>
-            </a:r>
-            <a:r>
-              <a:rPr lang="en-US" sz="1600" dirty="0" err="1" smtClean="0"/>
-              <a:t>enemigo</a:t>
-            </a:r>
-            <a:r>
-              <a:rPr lang="en-US" sz="1600" dirty="0" smtClean="0"/>
-              <a:t>.- </a:t>
-            </a:r>
-            <a:r>
-              <a:rPr lang="en-US" sz="1600" dirty="0" err="1"/>
-              <a:t>Suelta</a:t>
-            </a:r>
-            <a:r>
-              <a:rPr lang="en-US" sz="1600" dirty="0"/>
-              <a:t> a </a:t>
-            </a:r>
-            <a:r>
-              <a:rPr lang="en-US" sz="1600" dirty="0" err="1"/>
-              <a:t>destiempo</a:t>
-            </a:r>
-            <a:r>
-              <a:rPr lang="en-US" sz="1600" dirty="0"/>
-              <a:t> las </a:t>
-            </a:r>
-            <a:r>
-              <a:rPr lang="en-US" sz="1600" dirty="0" err="1"/>
-              <a:t>bombas</a:t>
-            </a:r>
-            <a:r>
-              <a:rPr lang="en-US" sz="1600" dirty="0"/>
-              <a:t> </a:t>
-            </a:r>
-            <a:r>
-              <a:rPr lang="en-US" sz="1600" dirty="0" err="1"/>
-              <a:t>en</a:t>
-            </a:r>
-            <a:r>
-              <a:rPr lang="en-US" sz="1600" dirty="0"/>
-              <a:t> </a:t>
-            </a:r>
-            <a:r>
-              <a:rPr lang="en-US" sz="1600" dirty="0" smtClean="0"/>
-              <a:t>el </a:t>
-            </a:r>
-            <a:r>
-              <a:rPr lang="en-US" sz="1600" dirty="0" err="1" smtClean="0"/>
-              <a:t>blanco</a:t>
-            </a:r>
-            <a:r>
-              <a:rPr lang="en-US" sz="1600" dirty="0" smtClean="0"/>
-              <a:t>.- “</a:t>
-            </a:r>
-            <a:r>
-              <a:rPr lang="en-US" sz="1600" dirty="0" err="1" smtClean="0"/>
-              <a:t>Toca</a:t>
-            </a:r>
-            <a:r>
-              <a:rPr lang="en-US" sz="1600" dirty="0" smtClean="0"/>
-              <a:t>” el  </a:t>
-            </a:r>
-            <a:r>
-              <a:rPr lang="en-US" sz="1600" dirty="0" err="1" smtClean="0"/>
-              <a:t>océano</a:t>
-            </a:r>
-            <a:r>
-              <a:rPr lang="en-US" sz="1600" dirty="0" smtClean="0"/>
-              <a:t>.</a:t>
-            </a:r>
-          </a:p>
-          <a:p>
-            <a:endParaRPr lang="en-US" sz="1600" dirty="0"/>
-          </a:p>
-          <a:p>
-            <a:endParaRPr lang="en-US" sz="2400" dirty="0" smtClean="0"/>
-          </a:p>
-        </p:txBody>
-      </p:sp>
-      <p:pic>
-        <p:nvPicPr>
-          <p:cNvPr id="4" name="Imagen 3"/>
-          <p:cNvPicPr>
-            <a:picLocks noChangeAspect="1"/>
-          </p:cNvPicPr>
-          <p:nvPr/>
-        </p:nvPicPr>
-        <p:blipFill>
-          <a:blip r:embed="rId4" cstate="print">
-            <a:extLst>
-              <a:ext uri="{28A0092B-C50C-407E-A947-70E740481C1C}">
-                <a14:useLocalDpi xmlns:a14="http://schemas.microsoft.com/office/drawing/2010/main" val="0"/>
-              </a:ext>
-            </a:extLst>
-          </a:blip>
-          <a:stretch>
-            <a:fillRect/>
-          </a:stretch>
-        </p:blipFill>
-        <p:spPr>
-          <a:xfrm>
-            <a:off x="914399" y="4360452"/>
-            <a:ext cx="3549886" cy="2497548"/>
-          </a:xfrm>
-          <a:prstGeom prst="rect">
-            <a:avLst/>
-          </a:prstGeom>
-        </p:spPr>
-      </p:pic>
-      <p:pic>
-        <p:nvPicPr>
-          <p:cNvPr id="5" name="Cortina_Vision7">
-            <a:hlinkClick r:id="" action="ppaction://media"/>
-          </p:cNvPr>
-          <p:cNvPicPr>
-            <a:picLocks noChangeAspect="1"/>
-          </p:cNvPicPr>
-          <p:nvPr>
-            <a:audioFile r:link="rId2"/>
-            <p:extLst>
-              <p:ext uri="{DAA4B4D4-6D71-4841-9C94-3DE7FCFB9230}">
-                <p14:media xmlns:p14="http://schemas.microsoft.com/office/powerpoint/2010/main" r:embed="rId1"/>
-              </p:ext>
-            </p:extLst>
-          </p:nvPr>
-        </p:nvPicPr>
-        <p:blipFill>
-          <a:blip r:embed="rId5"/>
-          <a:stretch>
-            <a:fillRect/>
-          </a:stretch>
-        </p:blipFill>
-        <p:spPr>
-          <a:xfrm>
-            <a:off x="5791200" y="3124200"/>
-            <a:ext cx="609600" cy="609600"/>
-          </a:xfrm>
-          <a:prstGeom prst="rect">
-            <a:avLst/>
-          </a:prstGeom>
-        </p:spPr>
-      </p:pic>
-    </p:spTree>
-    <p:extLst>
-      <p:ext uri="{BB962C8B-B14F-4D97-AF65-F5344CB8AC3E}">
-        <p14:creationId xmlns:p14="http://schemas.microsoft.com/office/powerpoint/2010/main" val="3444360332"/>
+        <p14:creationId xmlns:p14="http://schemas.microsoft.com/office/powerpoint/2010/main" val="2625432970"/>
       </p:ext>
     </p:extLst>
   </p:cSld>

</xml_diff>